<commit_message>
Add slides for Part II
</commit_message>
<xml_diff>
--- a/slides/HotChocolate_Part_1.pptx
+++ b/slides/HotChocolate_Part_1.pptx
@@ -15174,7 +15174,7 @@
         <p:spPr>
           <a:xfrm>
             <a:off x="4798290" y="5064654"/>
-            <a:ext cx="3238387" cy="369332"/>
+            <a:ext cx="3175869" cy="369332"/>
           </a:xfrm>
           <a:prstGeom prst="rect">
             <a:avLst/>
@@ -15197,7 +15197,7 @@
                 </a:solidFill>
                 <a:latin typeface="Raleway" pitchFamily="2" charset="77"/>
               </a:rPr>
-              <a:t>15:00 – End of the workshop</a:t>
+              <a:t>17:00 – End of the workshop</a:t>
             </a:r>
           </a:p>
         </p:txBody>

</xml_diff>

<commit_message>
Update Slides with pictures
</commit_message>
<xml_diff>
--- a/slides/HotChocolate_Part_1.pptx
+++ b/slides/HotChocolate_Part_1.pptx
@@ -5848,152 +5848,130 @@
           </a:p>
         </p:txBody>
       </p:sp>
-      <p:grpSp>
-        <p:nvGrpSpPr>
-          <p:cNvPr id="7" name="Group 6">
-            <a:extLst>
-              <a:ext uri="{FF2B5EF4-FFF2-40B4-BE49-F238E27FC236}">
-                <a16:creationId xmlns:a16="http://schemas.microsoft.com/office/drawing/2014/main" id="{A8F36148-082F-A941-8000-3A91A742E84B}"/>
-              </a:ext>
-            </a:extLst>
-          </p:cNvPr>
-          <p:cNvGrpSpPr/>
-          <p:nvPr/>
-        </p:nvGrpSpPr>
-        <p:grpSpPr>
-          <a:xfrm>
-            <a:off x="8163144" y="5067962"/>
-            <a:ext cx="1324402" cy="1463837"/>
-            <a:chOff x="8028517" y="4403583"/>
-            <a:chExt cx="1324402" cy="1463837"/>
-          </a:xfrm>
-        </p:grpSpPr>
-        <p:sp>
-          <p:nvSpPr>
-            <p:cNvPr id="5" name="Textfeld 5">
-              <a:extLst>
-                <a:ext uri="{FF2B5EF4-FFF2-40B4-BE49-F238E27FC236}">
-                  <a16:creationId xmlns:a16="http://schemas.microsoft.com/office/drawing/2014/main" id="{7F3E5D12-E7B3-4543-B53D-B3930FFF0F7D}"/>
-                </a:ext>
-              </a:extLst>
-            </p:cNvPr>
-            <p:cNvSpPr txBox="1"/>
-            <p:nvPr/>
-          </p:nvSpPr>
-          <p:spPr>
-            <a:xfrm>
-              <a:off x="8028517" y="5344200"/>
-              <a:ext cx="1324402" cy="523220"/>
-            </a:xfrm>
-            <a:prstGeom prst="rect">
-              <a:avLst/>
-            </a:prstGeom>
-            <a:noFill/>
-          </p:spPr>
-          <p:txBody>
-            <a:bodyPr wrap="none" rtlCol="0">
-              <a:spAutoFit/>
-            </a:bodyPr>
-            <a:lstStyle/>
-            <a:p>
-              <a:pPr algn="ctr"/>
-              <a:r>
-                <a:rPr lang="en-US" sz="1400" dirty="0">
-                  <a:solidFill>
-                    <a:schemeClr val="tx1">
-                      <a:lumMod val="75000"/>
-                      <a:lumOff val="25000"/>
-                    </a:schemeClr>
-                  </a:solidFill>
-                  <a:latin typeface="Raleway" pitchFamily="2" charset="77"/>
-                </a:rPr>
-                <a:t>Robert Meyer</a:t>
-              </a:r>
-            </a:p>
-            <a:p>
-              <a:pPr algn="ctr"/>
-              <a:r>
-                <a:rPr lang="en-US" sz="1400" b="1" dirty="0">
-                  <a:solidFill>
-                    <a:schemeClr val="tx1">
-                      <a:lumMod val="75000"/>
-                      <a:lumOff val="25000"/>
-                    </a:schemeClr>
-                  </a:solidFill>
-                  <a:latin typeface="Raleway" pitchFamily="2" charset="77"/>
-                </a:rPr>
-                <a:t>@</a:t>
-              </a:r>
-              <a:r>
-                <a:rPr lang="en-US" sz="1400" b="1" dirty="0" err="1">
-                  <a:solidFill>
-                    <a:schemeClr val="tx1">
-                      <a:lumMod val="75000"/>
-                      <a:lumOff val="25000"/>
-                    </a:schemeClr>
-                  </a:solidFill>
-                  <a:latin typeface="Raleway" pitchFamily="2" charset="77"/>
-                </a:rPr>
-                <a:t>roeb</a:t>
-              </a:r>
-              <a:r>
-                <a:rPr lang="en-US" sz="1400" b="1" dirty="0">
-                  <a:solidFill>
-                    <a:schemeClr val="tx1">
-                      <a:lumMod val="75000"/>
-                      <a:lumOff val="25000"/>
-                    </a:schemeClr>
-                  </a:solidFill>
-                  <a:latin typeface="Raleway" pitchFamily="2" charset="77"/>
-                </a:rPr>
-                <a:t> </a:t>
-              </a:r>
-            </a:p>
-          </p:txBody>
-        </p:sp>
-        <p:pic>
-          <p:nvPicPr>
-            <p:cNvPr id="6" name="Grafik 3">
-              <a:extLst>
-                <a:ext uri="{FF2B5EF4-FFF2-40B4-BE49-F238E27FC236}">
-                  <a16:creationId xmlns:a16="http://schemas.microsoft.com/office/drawing/2014/main" id="{7B8661C9-FF48-D849-A96C-9CC4F2F9CC0C}"/>
-                </a:ext>
-              </a:extLst>
-            </p:cNvPr>
-            <p:cNvPicPr>
-              <a:picLocks noChangeAspect="1"/>
-            </p:cNvPicPr>
-            <p:nvPr/>
-          </p:nvPicPr>
-          <p:blipFill>
-            <a:blip r:embed="rId2">
-              <a:extLst>
-                <a:ext uri="{28A0092B-C50C-407E-A947-70E740481C1C}">
-                  <a14:useLocalDpi xmlns:a14="http://schemas.microsoft.com/office/drawing/2010/main" val="0"/>
-                </a:ext>
-              </a:extLst>
-            </a:blip>
-            <a:stretch>
-              <a:fillRect/>
-            </a:stretch>
-          </p:blipFill>
-          <p:spPr>
-            <a:xfrm>
-              <a:off x="8295541" y="4403583"/>
-              <a:ext cx="790355" cy="866726"/>
-            </a:xfrm>
-            <a:prstGeom prst="rect">
-              <a:avLst/>
-            </a:prstGeom>
-          </p:spPr>
-        </p:pic>
-      </p:grpSp>
       <p:sp>
         <p:nvSpPr>
-          <p:cNvPr id="9" name="Textfeld 5">
-            <a:extLst>
-              <a:ext uri="{FF2B5EF4-FFF2-40B4-BE49-F238E27FC236}">
-                <a16:creationId xmlns:a16="http://schemas.microsoft.com/office/drawing/2014/main" id="{0FC52AE4-C54E-934B-954A-B1512883E000}"/>
+          <p:cNvPr id="14" name="Subtitle 2">
+            <a:extLst>
+              <a:ext uri="{FF2B5EF4-FFF2-40B4-BE49-F238E27FC236}">
+                <a16:creationId xmlns:a16="http://schemas.microsoft.com/office/drawing/2014/main" id="{5A30C294-B15A-A14A-9114-6D94119310D3}"/>
+              </a:ext>
+            </a:extLst>
+          </p:cNvPr>
+          <p:cNvSpPr>
+            <a:spLocks noGrp="1"/>
+          </p:cNvSpPr>
+          <p:nvPr>
+            <p:ph type="subTitle" idx="1"/>
+          </p:nvPr>
+        </p:nvSpPr>
+        <p:spPr>
+          <a:xfrm>
+            <a:off x="4207164" y="3705046"/>
+            <a:ext cx="9144000" cy="1655762"/>
+          </a:xfrm>
+        </p:spPr>
+        <p:txBody>
+          <a:bodyPr/>
+          <a:lstStyle/>
+          <a:p>
+            <a:r>
+              <a:rPr lang="de-DE" dirty="0">
+                <a:latin typeface="Raleway" pitchFamily="2" charset="77"/>
+              </a:rPr>
+              <a:t>Part I</a:t>
+            </a:r>
+          </a:p>
+        </p:txBody>
+      </p:sp>
+      <p:sp>
+        <p:nvSpPr>
+          <p:cNvPr id="10" name="Textfeld 5">
+            <a:extLst>
+              <a:ext uri="{FF2B5EF4-FFF2-40B4-BE49-F238E27FC236}">
+                <a16:creationId xmlns:a16="http://schemas.microsoft.com/office/drawing/2014/main" id="{7A04C4C9-DC61-BE48-9E71-58054ADF6653}"/>
+              </a:ext>
+            </a:extLst>
+          </p:cNvPr>
+          <p:cNvSpPr txBox="1"/>
+          <p:nvPr/>
+        </p:nvSpPr>
+        <p:spPr>
+          <a:xfrm>
+            <a:off x="8163144" y="6008579"/>
+            <a:ext cx="1324402" cy="523220"/>
+          </a:xfrm>
+          <a:prstGeom prst="rect">
+            <a:avLst/>
+          </a:prstGeom>
+          <a:noFill/>
+        </p:spPr>
+        <p:txBody>
+          <a:bodyPr wrap="none" rtlCol="0">
+            <a:spAutoFit/>
+          </a:bodyPr>
+          <a:lstStyle/>
+          <a:p>
+            <a:pPr algn="ctr"/>
+            <a:r>
+              <a:rPr lang="en-US" sz="1400" dirty="0">
+                <a:solidFill>
+                  <a:schemeClr val="tx1">
+                    <a:lumMod val="75000"/>
+                    <a:lumOff val="25000"/>
+                  </a:schemeClr>
+                </a:solidFill>
+                <a:latin typeface="Raleway" pitchFamily="2" charset="77"/>
+              </a:rPr>
+              <a:t>Robert Meyer</a:t>
+            </a:r>
+          </a:p>
+          <a:p>
+            <a:pPr algn="ctr"/>
+            <a:r>
+              <a:rPr lang="en-US" sz="1400" b="1" dirty="0">
+                <a:solidFill>
+                  <a:schemeClr val="tx1">
+                    <a:lumMod val="75000"/>
+                    <a:lumOff val="25000"/>
+                  </a:schemeClr>
+                </a:solidFill>
+                <a:latin typeface="Raleway" pitchFamily="2" charset="77"/>
+              </a:rPr>
+              <a:t>@</a:t>
+            </a:r>
+            <a:r>
+              <a:rPr lang="en-US" sz="1400" b="1" dirty="0" err="1">
+                <a:solidFill>
+                  <a:schemeClr val="tx1">
+                    <a:lumMod val="75000"/>
+                    <a:lumOff val="25000"/>
+                  </a:schemeClr>
+                </a:solidFill>
+                <a:latin typeface="Raleway" pitchFamily="2" charset="77"/>
+              </a:rPr>
+              <a:t>roeb</a:t>
+            </a:r>
+            <a:r>
+              <a:rPr lang="en-US" sz="1400" b="1" dirty="0">
+                <a:solidFill>
+                  <a:schemeClr val="tx1">
+                    <a:lumMod val="75000"/>
+                    <a:lumOff val="25000"/>
+                  </a:schemeClr>
+                </a:solidFill>
+                <a:latin typeface="Raleway" pitchFamily="2" charset="77"/>
+              </a:rPr>
+              <a:t> </a:t>
+            </a:r>
+          </a:p>
+        </p:txBody>
+      </p:sp>
+      <p:sp>
+        <p:nvSpPr>
+          <p:cNvPr id="11" name="Textfeld 5">
+            <a:extLst>
+              <a:ext uri="{FF2B5EF4-FFF2-40B4-BE49-F238E27FC236}">
+                <a16:creationId xmlns:a16="http://schemas.microsoft.com/office/drawing/2014/main" id="{F784331D-40C3-D84F-B423-6FBDB253563E}"/>
               </a:ext>
             </a:extLst>
           </p:cNvPr>
@@ -6073,10 +6051,10 @@
       </p:sp>
       <p:sp>
         <p:nvSpPr>
-          <p:cNvPr id="12" name="Textfeld 5">
-            <a:extLst>
-              <a:ext uri="{FF2B5EF4-FFF2-40B4-BE49-F238E27FC236}">
-                <a16:creationId xmlns:a16="http://schemas.microsoft.com/office/drawing/2014/main" id="{4060C95B-36D8-304E-B2A4-3DBD63E5B23B}"/>
+          <p:cNvPr id="13" name="Textfeld 5">
+            <a:extLst>
+              <a:ext uri="{FF2B5EF4-FFF2-40B4-BE49-F238E27FC236}">
+                <a16:creationId xmlns:a16="http://schemas.microsoft.com/office/drawing/2014/main" id="{CDD43A74-B697-D243-90FB-ADBC9CF6AA88}"/>
               </a:ext>
             </a:extLst>
           </p:cNvPr>
@@ -6175,41 +6153,96 @@
           </a:p>
         </p:txBody>
       </p:sp>
-      <p:sp>
-        <p:nvSpPr>
-          <p:cNvPr id="14" name="Subtitle 2">
-            <a:extLst>
-              <a:ext uri="{FF2B5EF4-FFF2-40B4-BE49-F238E27FC236}">
-                <a16:creationId xmlns:a16="http://schemas.microsoft.com/office/drawing/2014/main" id="{5A30C294-B15A-A14A-9114-6D94119310D3}"/>
-              </a:ext>
-            </a:extLst>
-          </p:cNvPr>
-          <p:cNvSpPr>
-            <a:spLocks noGrp="1"/>
-          </p:cNvSpPr>
-          <p:nvPr>
-            <p:ph type="subTitle" idx="1"/>
-          </p:nvPr>
-        </p:nvSpPr>
+      <p:pic>
+        <p:nvPicPr>
+          <p:cNvPr id="15" name="Picture 14">
+            <a:extLst>
+              <a:ext uri="{FF2B5EF4-FFF2-40B4-BE49-F238E27FC236}">
+                <a16:creationId xmlns:a16="http://schemas.microsoft.com/office/drawing/2014/main" id="{D8D68C52-BCF4-F847-8479-BA8C33D66A77}"/>
+              </a:ext>
+            </a:extLst>
+          </p:cNvPr>
+          <p:cNvPicPr>
+            <a:picLocks noChangeAspect="1"/>
+          </p:cNvPicPr>
+          <p:nvPr/>
+        </p:nvPicPr>
+        <p:blipFill>
+          <a:blip r:embed="rId2"/>
+          <a:stretch>
+            <a:fillRect/>
+          </a:stretch>
+        </p:blipFill>
         <p:spPr>
           <a:xfrm>
-            <a:off x="4207164" y="3705046"/>
-            <a:ext cx="9144000" cy="1655762"/>
+            <a:off x="6267363" y="4757805"/>
+            <a:ext cx="1250774" cy="1250774"/>
           </a:xfrm>
+          <a:prstGeom prst="rect">
+            <a:avLst/>
+          </a:prstGeom>
         </p:spPr>
-        <p:txBody>
-          <a:bodyPr/>
-          <a:lstStyle/>
-          <a:p>
-            <a:r>
-              <a:rPr lang="de-DE" dirty="0">
-                <a:latin typeface="Raleway" pitchFamily="2" charset="77"/>
-              </a:rPr>
-              <a:t>Part I</a:t>
-            </a:r>
-          </a:p>
-        </p:txBody>
-      </p:sp>
+      </p:pic>
+      <p:pic>
+        <p:nvPicPr>
+          <p:cNvPr id="16" name="Picture 15">
+            <a:extLst>
+              <a:ext uri="{FF2B5EF4-FFF2-40B4-BE49-F238E27FC236}">
+                <a16:creationId xmlns:a16="http://schemas.microsoft.com/office/drawing/2014/main" id="{416F35C0-EFEB-9C49-9FFC-71BF8BA5BADC}"/>
+              </a:ext>
+            </a:extLst>
+          </p:cNvPr>
+          <p:cNvPicPr>
+            <a:picLocks noChangeAspect="1"/>
+          </p:cNvPicPr>
+          <p:nvPr/>
+        </p:nvPicPr>
+        <p:blipFill>
+          <a:blip r:embed="rId3"/>
+          <a:stretch>
+            <a:fillRect/>
+          </a:stretch>
+        </p:blipFill>
+        <p:spPr>
+          <a:xfrm>
+            <a:off x="8245153" y="4803756"/>
+            <a:ext cx="1160383" cy="1204823"/>
+          </a:xfrm>
+          <a:prstGeom prst="rect">
+            <a:avLst/>
+          </a:prstGeom>
+        </p:spPr>
+      </p:pic>
+      <p:pic>
+        <p:nvPicPr>
+          <p:cNvPr id="17" name="Picture 16">
+            <a:extLst>
+              <a:ext uri="{FF2B5EF4-FFF2-40B4-BE49-F238E27FC236}">
+                <a16:creationId xmlns:a16="http://schemas.microsoft.com/office/drawing/2014/main" id="{8580C0F2-5D47-044D-B5EA-262F484173A6}"/>
+              </a:ext>
+            </a:extLst>
+          </p:cNvPr>
+          <p:cNvPicPr>
+            <a:picLocks noChangeAspect="1"/>
+          </p:cNvPicPr>
+          <p:nvPr/>
+        </p:nvPicPr>
+        <p:blipFill>
+          <a:blip r:embed="rId4"/>
+          <a:stretch>
+            <a:fillRect/>
+          </a:stretch>
+        </p:blipFill>
+        <p:spPr>
+          <a:xfrm>
+            <a:off x="9887180" y="4740681"/>
+            <a:ext cx="1423554" cy="1240253"/>
+          </a:xfrm>
+          <a:prstGeom prst="rect">
+            <a:avLst/>
+          </a:prstGeom>
+        </p:spPr>
+      </p:pic>
     </p:spTree>
     <p:extLst>
       <p:ext uri="{BB962C8B-B14F-4D97-AF65-F5344CB8AC3E}">

</xml_diff>